<commit_message>
Configured to be multiplayer
</commit_message>
<xml_diff>
--- a/SafeTens with Akka - 2nd April 2020.pptx
+++ b/SafeTens with Akka - 2nd April 2020.pptx
@@ -7,8 +7,9 @@
   <p:sldIdLst>
     <p:sldId id="256" r:id="rId2"/>
     <p:sldId id="309" r:id="rId3"/>
-    <p:sldId id="266" r:id="rId4"/>
-    <p:sldId id="308" r:id="rId5"/>
+    <p:sldId id="310" r:id="rId4"/>
+    <p:sldId id="266" r:id="rId5"/>
+    <p:sldId id="308" r:id="rId6"/>
   </p:sldIdLst>
   <p:sldSz cx="12192000" cy="6858000"/>
   <p:notesSz cx="6858000" cy="9144000"/>
@@ -7697,12 +7698,14 @@
         </p:nvSpPr>
         <p:spPr/>
         <p:txBody>
-          <a:bodyPr/>
+          <a:bodyPr>
+            <a:normAutofit fontScale="90000"/>
+          </a:bodyPr>
           <a:lstStyle/>
           <a:p>
             <a:r>
               <a:rPr lang="en-GB" dirty="0"/>
-              <a:t>Geometric Algebra in F#</a:t>
+              <a:t>Over-complicating a toy problem with SAFE Stack and Akka.NET</a:t>
             </a:r>
           </a:p>
         </p:txBody>
@@ -7899,6 +7902,91 @@
 </file>
 
 <file path=ppt/slides/slide3.xml><?xml version="1.0" encoding="utf-8"?>
+<p:sld xmlns:a="http://schemas.openxmlformats.org/drawingml/2006/main" xmlns:r="http://schemas.openxmlformats.org/officeDocument/2006/relationships" xmlns:p="http://schemas.openxmlformats.org/presentationml/2006/main">
+  <p:cSld>
+    <p:spTree>
+      <p:nvGrpSpPr>
+        <p:cNvPr id="1" name=""/>
+        <p:cNvGrpSpPr/>
+        <p:nvPr/>
+      </p:nvGrpSpPr>
+      <p:grpSpPr>
+        <a:xfrm>
+          <a:off x="0" y="0"/>
+          <a:ext cx="0" cy="0"/>
+          <a:chOff x="0" y="0"/>
+          <a:chExt cx="0" cy="0"/>
+        </a:xfrm>
+      </p:grpSpPr>
+      <p:sp>
+        <p:nvSpPr>
+          <p:cNvPr id="2" name="Title 1">
+            <a:extLst>
+              <a:ext uri="{FF2B5EF4-FFF2-40B4-BE49-F238E27FC236}">
+                <a16:creationId xmlns:a16="http://schemas.microsoft.com/office/drawing/2014/main" id="{7D5E7AD5-863A-4875-850D-24C48A97547B}"/>
+              </a:ext>
+            </a:extLst>
+          </p:cNvPr>
+          <p:cNvSpPr>
+            <a:spLocks noGrp="1"/>
+          </p:cNvSpPr>
+          <p:nvPr>
+            <p:ph type="title"/>
+          </p:nvPr>
+        </p:nvSpPr>
+        <p:spPr/>
+        <p:txBody>
+          <a:bodyPr/>
+          <a:lstStyle/>
+          <a:p>
+            <a:endParaRPr lang="en-GB"/>
+          </a:p>
+        </p:txBody>
+      </p:sp>
+      <p:pic>
+        <p:nvPicPr>
+          <p:cNvPr id="3" name="Picture 2">
+            <a:extLst>
+              <a:ext uri="{FF2B5EF4-FFF2-40B4-BE49-F238E27FC236}">
+                <a16:creationId xmlns:a16="http://schemas.microsoft.com/office/drawing/2014/main" id="{343AD1C6-302C-4282-BE9D-240E55C4276B}"/>
+              </a:ext>
+            </a:extLst>
+          </p:cNvPr>
+          <p:cNvPicPr>
+            <a:picLocks noChangeAspect="1"/>
+          </p:cNvPicPr>
+          <p:nvPr/>
+        </p:nvPicPr>
+        <p:blipFill>
+          <a:blip r:embed="rId2"/>
+          <a:stretch>
+            <a:fillRect/>
+          </a:stretch>
+        </p:blipFill>
+        <p:spPr>
+          <a:xfrm>
+            <a:off x="3674375" y="2294557"/>
+            <a:ext cx="5819250" cy="3645072"/>
+          </a:xfrm>
+          <a:prstGeom prst="rect">
+            <a:avLst/>
+          </a:prstGeom>
+        </p:spPr>
+      </p:pic>
+    </p:spTree>
+    <p:extLst>
+      <p:ext uri="{BB962C8B-B14F-4D97-AF65-F5344CB8AC3E}">
+        <p14:creationId xmlns:p14="http://schemas.microsoft.com/office/powerpoint/2010/main" val="3334349841"/>
+      </p:ext>
+    </p:extLst>
+  </p:cSld>
+  <p:clrMapOvr>
+    <a:masterClrMapping/>
+  </p:clrMapOvr>
+</p:sld>
+</file>
+
+<file path=ppt/slides/slide4.xml><?xml version="1.0" encoding="utf-8"?>
 <p:sld xmlns:a="http://schemas.openxmlformats.org/drawingml/2006/main" xmlns:r="http://schemas.openxmlformats.org/officeDocument/2006/relationships" xmlns:p="http://schemas.openxmlformats.org/presentationml/2006/main">
   <p:cSld>
     <p:spTree>
@@ -8387,7 +8475,7 @@
 </p:sld>
 </file>
 
-<file path=ppt/slides/slide4.xml><?xml version="1.0" encoding="utf-8"?>
+<file path=ppt/slides/slide5.xml><?xml version="1.0" encoding="utf-8"?>
 <p:sld xmlns:a="http://schemas.openxmlformats.org/drawingml/2006/main" xmlns:r="http://schemas.openxmlformats.org/officeDocument/2006/relationships" xmlns:p="http://schemas.openxmlformats.org/presentationml/2006/main">
   <p:cSld>
     <p:spTree>

</xml_diff>